<commit_message>
10/15/2014 6:23PM from office
</commit_message>
<xml_diff>
--- a/SampleVideos/more/khan9/manual_linear.pptx
+++ b/SampleVideos/more/khan9/manual_linear.pptx
@@ -6,6 +6,7 @@
   </p:sldMasterIdLst>
   <p:sldIdLst>
     <p:sldId id="257" r:id="rId2"/>
+    <p:sldId id="258" r:id="rId3"/>
   </p:sldIdLst>
   <p:sldSz cx="18002250" cy="18002250"/>
   <p:notesSz cx="6858000" cy="9144000"/>
@@ -288,7 +289,7 @@
           <a:p>
             <a:fld id="{B13E8AF3-69E6-4EED-8ECD-14AF842C56A7}" type="datetimeFigureOut">
               <a:rPr lang="en-US" smtClean="0"/>
-              <a:t>10/14/2014</a:t>
+              <a:t>10/14/14</a:t>
             </a:fld>
             <a:endParaRPr lang="en-US"/>
           </a:p>
@@ -458,7 +459,7 @@
           <a:p>
             <a:fld id="{B13E8AF3-69E6-4EED-8ECD-14AF842C56A7}" type="datetimeFigureOut">
               <a:rPr lang="en-US" smtClean="0"/>
-              <a:t>10/14/2014</a:t>
+              <a:t>10/14/14</a:t>
             </a:fld>
             <a:endParaRPr lang="en-US"/>
           </a:p>
@@ -638,7 +639,7 @@
           <a:p>
             <a:fld id="{B13E8AF3-69E6-4EED-8ECD-14AF842C56A7}" type="datetimeFigureOut">
               <a:rPr lang="en-US" smtClean="0"/>
-              <a:t>10/14/2014</a:t>
+              <a:t>10/14/14</a:t>
             </a:fld>
             <a:endParaRPr lang="en-US"/>
           </a:p>
@@ -808,7 +809,7 @@
           <a:p>
             <a:fld id="{B13E8AF3-69E6-4EED-8ECD-14AF842C56A7}" type="datetimeFigureOut">
               <a:rPr lang="en-US" smtClean="0"/>
-              <a:t>10/14/2014</a:t>
+              <a:t>10/14/14</a:t>
             </a:fld>
             <a:endParaRPr lang="en-US"/>
           </a:p>
@@ -1054,7 +1055,7 @@
           <a:p>
             <a:fld id="{B13E8AF3-69E6-4EED-8ECD-14AF842C56A7}" type="datetimeFigureOut">
               <a:rPr lang="en-US" smtClean="0"/>
-              <a:t>10/14/2014</a:t>
+              <a:t>10/14/14</a:t>
             </a:fld>
             <a:endParaRPr lang="en-US"/>
           </a:p>
@@ -1342,7 +1343,7 @@
           <a:p>
             <a:fld id="{B13E8AF3-69E6-4EED-8ECD-14AF842C56A7}" type="datetimeFigureOut">
               <a:rPr lang="en-US" smtClean="0"/>
-              <a:t>10/14/2014</a:t>
+              <a:t>10/14/14</a:t>
             </a:fld>
             <a:endParaRPr lang="en-US"/>
           </a:p>
@@ -1764,7 +1765,7 @@
           <a:p>
             <a:fld id="{B13E8AF3-69E6-4EED-8ECD-14AF842C56A7}" type="datetimeFigureOut">
               <a:rPr lang="en-US" smtClean="0"/>
-              <a:t>10/14/2014</a:t>
+              <a:t>10/14/14</a:t>
             </a:fld>
             <a:endParaRPr lang="en-US"/>
           </a:p>
@@ -1882,7 +1883,7 @@
           <a:p>
             <a:fld id="{B13E8AF3-69E6-4EED-8ECD-14AF842C56A7}" type="datetimeFigureOut">
               <a:rPr lang="en-US" smtClean="0"/>
-              <a:t>10/14/2014</a:t>
+              <a:t>10/14/14</a:t>
             </a:fld>
             <a:endParaRPr lang="en-US"/>
           </a:p>
@@ -1977,7 +1978,7 @@
           <a:p>
             <a:fld id="{B13E8AF3-69E6-4EED-8ECD-14AF842C56A7}" type="datetimeFigureOut">
               <a:rPr lang="en-US" smtClean="0"/>
-              <a:t>10/14/2014</a:t>
+              <a:t>10/14/14</a:t>
             </a:fld>
             <a:endParaRPr lang="en-US"/>
           </a:p>
@@ -2254,7 +2255,7 @@
           <a:p>
             <a:fld id="{B13E8AF3-69E6-4EED-8ECD-14AF842C56A7}" type="datetimeFigureOut">
               <a:rPr lang="en-US" smtClean="0"/>
-              <a:t>10/14/2014</a:t>
+              <a:t>10/14/14</a:t>
             </a:fld>
             <a:endParaRPr lang="en-US"/>
           </a:p>
@@ -2507,7 +2508,7 @@
           <a:p>
             <a:fld id="{B13E8AF3-69E6-4EED-8ECD-14AF842C56A7}" type="datetimeFigureOut">
               <a:rPr lang="en-US" smtClean="0"/>
-              <a:t>10/14/2014</a:t>
+              <a:t>10/14/14</a:t>
             </a:fld>
             <a:endParaRPr lang="en-US"/>
           </a:p>
@@ -2720,7 +2721,7 @@
           <a:p>
             <a:fld id="{B13E8AF3-69E6-4EED-8ECD-14AF842C56A7}" type="datetimeFigureOut">
               <a:rPr lang="en-US" smtClean="0"/>
-              <a:t>10/14/2014</a:t>
+              <a:t>10/14/14</a:t>
             </a:fld>
             <a:endParaRPr lang="en-US"/>
           </a:p>
@@ -3283,14 +3284,7 @@
                 <a:noFill/>
               </a:ln>
               <a:extLst>
-                <a:ext uri="{909E8E84-426E-40DD-AFC4-6F175D3DCCD1}">
-                  <a14:hiddenFill xmlns:a14="http://schemas.microsoft.com/office/drawing/2010/main">
-                    <a:solidFill>
-                      <a:schemeClr val="accent1"/>
-                    </a:solidFill>
-                  </a14:hiddenFill>
-                </a:ext>
-                <a:ext uri="{91240B29-F687-4F45-9708-019B960494DF}">
+                <a:ext uri="{91240B29-F687-4f45-9708-019B960494DF}">
                   <a14:hiddenLine xmlns:a14="http://schemas.microsoft.com/office/drawing/2010/main" w="9525">
                     <a:solidFill>
                       <a:schemeClr val="tx1"/>
@@ -3335,15 +3329,7 @@
                 </a:r>
                 <a:r>
                   <a:rPr lang="en-US" sz="1500" dirty="0"/>
-                  <a:t>x to the 3rd dx. </a:t>
-                </a:r>
-                <a:r>
-                  <a:rPr lang="en-US" sz="1500" dirty="0"/>
-                  <a:t>And then from that we can subtract the indefinite integral of this thing. </a:t>
-                </a:r>
-                <a:r>
-                  <a:rPr lang="en-US" sz="1500" dirty="0"/>
-                  <a:t>So we can say this is, and then minus. </a:t>
+                  <a:t>x to the 3rd dx. And then from that we can subtract the indefinite integral of this thing. So we can say this is, and then minus. </a:t>
                 </a:r>
                 <a:r>
                   <a:rPr lang="en-US" sz="1500" dirty="0" smtClean="0"/>
@@ -3728,11 +3714,7 @@
                 </a:r>
                 <a:r>
                   <a:rPr lang="en-US" sz="1500" dirty="0" err="1" smtClean="0"/>
-                  <a:t>front.</a:t>
-                </a:r>
-                <a:r>
-                  <a:rPr lang="en-US" sz="1500" dirty="0" err="1" smtClean="0"/>
-                  <a:t>Now</a:t>
+                  <a:t>front.Now</a:t>
                 </a:r>
                 <a:r>
                   <a:rPr lang="en-US" sz="1500" dirty="0" smtClean="0"/>
@@ -3765,7 +3747,7 @@
             </p:blipFill>
             <p:spPr bwMode="auto">
               <a:xfrm>
-                <a:off x="295475" y="4867050"/>
+                <a:off x="295475" y="5107797"/>
                 <a:ext cx="9518691" cy="1661081"/>
               </a:xfrm>
               <a:prstGeom prst="rect">
@@ -3776,14 +3758,7 @@
                 <a:noFill/>
               </a:ln>
               <a:extLst>
-                <a:ext uri="{909E8E84-426E-40DD-AFC4-6F175D3DCCD1}">
-                  <a14:hiddenFill xmlns:a14="http://schemas.microsoft.com/office/drawing/2010/main">
-                    <a:solidFill>
-                      <a:schemeClr val="accent1"/>
-                    </a:solidFill>
-                  </a14:hiddenFill>
-                </a:ext>
-                <a:ext uri="{91240B29-F687-4F45-9708-019B960494DF}">
+                <a:ext uri="{91240B29-F687-4f45-9708-019B960494DF}">
                   <a14:hiddenLine xmlns:a14="http://schemas.microsoft.com/office/drawing/2010/main" w="9525">
                     <a:solidFill>
                       <a:schemeClr val="tx1"/>
@@ -3828,7 +3803,7 @@
             </p:blipFill>
             <p:spPr bwMode="auto">
               <a:xfrm>
-                <a:off x="5607179" y="2688932"/>
+                <a:off x="5607179" y="2929679"/>
                 <a:ext cx="8755753" cy="3719376"/>
               </a:xfrm>
               <a:prstGeom prst="rect">
@@ -3839,14 +3814,7 @@
                 <a:noFill/>
               </a:ln>
               <a:extLst>
-                <a:ext uri="{909E8E84-426E-40DD-AFC4-6F175D3DCCD1}">
-                  <a14:hiddenFill xmlns:a14="http://schemas.microsoft.com/office/drawing/2010/main">
-                    <a:solidFill>
-                      <a:schemeClr val="accent1"/>
-                    </a:solidFill>
-                  </a14:hiddenFill>
-                </a:ext>
-                <a:ext uri="{91240B29-F687-4F45-9708-019B960494DF}">
+                <a:ext uri="{91240B29-F687-4f45-9708-019B960494DF}">
                   <a14:hiddenLine xmlns:a14="http://schemas.microsoft.com/office/drawing/2010/main" w="9525">
                     <a:solidFill>
                       <a:schemeClr val="tx1"/>
@@ -3891,14 +3859,7 @@
                 <a:noFill/>
               </a:ln>
               <a:extLst>
-                <a:ext uri="{909E8E84-426E-40DD-AFC4-6F175D3DCCD1}">
-                  <a14:hiddenFill xmlns:a14="http://schemas.microsoft.com/office/drawing/2010/main">
-                    <a:solidFill>
-                      <a:schemeClr val="accent1"/>
-                    </a:solidFill>
-                  </a14:hiddenFill>
-                </a:ext>
-                <a:ext uri="{91240B29-F687-4F45-9708-019B960494DF}">
+                <a:ext uri="{91240B29-F687-4f45-9708-019B960494DF}">
                   <a14:hiddenLine xmlns:a14="http://schemas.microsoft.com/office/drawing/2010/main" w="9525">
                     <a:solidFill>
                       <a:schemeClr val="tx1"/>
@@ -3943,14 +3904,7 @@
                 <a:noFill/>
               </a:ln>
               <a:extLst>
-                <a:ext uri="{909E8E84-426E-40DD-AFC4-6F175D3DCCD1}">
-                  <a14:hiddenFill xmlns:a14="http://schemas.microsoft.com/office/drawing/2010/main">
-                    <a:solidFill>
-                      <a:schemeClr val="accent1"/>
-                    </a:solidFill>
-                  </a14:hiddenFill>
-                </a:ext>
-                <a:ext uri="{91240B29-F687-4F45-9708-019B960494DF}">
+                <a:ext uri="{91240B29-F687-4f45-9708-019B960494DF}">
                   <a14:hiddenLine xmlns:a14="http://schemas.microsoft.com/office/drawing/2010/main" w="9525">
                     <a:solidFill>
                       <a:schemeClr val="tx1"/>
@@ -3997,14 +3951,7 @@
                 <a:noFill/>
               </a:ln>
               <a:extLst>
-                <a:ext uri="{909E8E84-426E-40DD-AFC4-6F175D3DCCD1}">
-                  <a14:hiddenFill xmlns:a14="http://schemas.microsoft.com/office/drawing/2010/main">
-                    <a:solidFill>
-                      <a:schemeClr val="accent1"/>
-                    </a:solidFill>
-                  </a14:hiddenFill>
-                </a:ext>
-                <a:ext uri="{91240B29-F687-4F45-9708-019B960494DF}">
+                <a:ext uri="{91240B29-F687-4f45-9708-019B960494DF}">
                   <a14:hiddenLine xmlns:a14="http://schemas.microsoft.com/office/drawing/2010/main" w="9525">
                     <a:solidFill>
                       <a:schemeClr val="tx1"/>
@@ -4264,14 +4211,7 @@
                 <a:noFill/>
               </a:ln>
               <a:extLst>
-                <a:ext uri="{909E8E84-426E-40DD-AFC4-6F175D3DCCD1}">
-                  <a14:hiddenFill xmlns:a14="http://schemas.microsoft.com/office/drawing/2010/main">
-                    <a:solidFill>
-                      <a:schemeClr val="accent1"/>
-                    </a:solidFill>
-                  </a14:hiddenFill>
-                </a:ext>
-                <a:ext uri="{91240B29-F687-4F45-9708-019B960494DF}">
+                <a:ext uri="{91240B29-F687-4f45-9708-019B960494DF}">
                   <a14:hiddenLine xmlns:a14="http://schemas.microsoft.com/office/drawing/2010/main" w="9525">
                     <a:solidFill>
                       <a:schemeClr val="tx1"/>
@@ -4299,10 +4239,446 @@
   <p:timing>
     <p:tnLst>
       <p:par>
-        <p:cTn id="1" dur="indefinite" restart="never" nodeType="tmRoot"/>
+        <p:cTn xmlns:p14="http://schemas.microsoft.com/office/powerpoint/2010/main" id="1" dur="indefinite" restart="never" nodeType="tmRoot"/>
       </p:par>
     </p:tnLst>
   </p:timing>
+</p:sld>
+</file>
+
+<file path=ppt/slides/slide2.xml><?xml version="1.0" encoding="utf-8"?>
+<p:sld xmlns:a="http://schemas.openxmlformats.org/drawingml/2006/main" xmlns:r="http://schemas.openxmlformats.org/officeDocument/2006/relationships" xmlns:p="http://schemas.openxmlformats.org/presentationml/2006/main">
+  <p:cSld>
+    <p:spTree>
+      <p:nvGrpSpPr>
+        <p:cNvPr id="1" name=""/>
+        <p:cNvGrpSpPr/>
+        <p:nvPr/>
+      </p:nvGrpSpPr>
+      <p:grpSpPr>
+        <a:xfrm>
+          <a:off x="0" y="0"/>
+          <a:ext cx="0" cy="0"/>
+          <a:chOff x="0" y="0"/>
+          <a:chExt cx="0" cy="0"/>
+        </a:xfrm>
+      </p:grpSpPr>
+      <p:pic>
+        <p:nvPicPr>
+          <p:cNvPr id="5" name="Picture 4" descr="panorama.png"/>
+          <p:cNvPicPr>
+            <a:picLocks noChangeAspect="1"/>
+          </p:cNvPicPr>
+          <p:nvPr/>
+        </p:nvPicPr>
+        <p:blipFill rotWithShape="1">
+          <a:blip r:embed="rId2">
+            <a:extLst>
+              <a:ext uri="{28A0092B-C50C-407E-A947-70E740481C1C}">
+                <a14:useLocalDpi xmlns:a14="http://schemas.microsoft.com/office/drawing/2010/main" val="0"/>
+              </a:ext>
+            </a:extLst>
+          </a:blip>
+          <a:srcRect r="66794" b="80830"/>
+          <a:stretch/>
+        </p:blipFill>
+        <p:spPr>
+          <a:xfrm>
+            <a:off x="144141" y="1584301"/>
+            <a:ext cx="5397973" cy="1752889"/>
+          </a:xfrm>
+          <a:prstGeom prst="rect">
+            <a:avLst/>
+          </a:prstGeom>
+        </p:spPr>
+      </p:pic>
+      <p:sp>
+        <p:nvSpPr>
+          <p:cNvPr id="7" name="Rectangle 6"/>
+          <p:cNvSpPr/>
+          <p:nvPr/>
+        </p:nvSpPr>
+        <p:spPr>
+          <a:xfrm>
+            <a:off x="34908" y="34281"/>
+            <a:ext cx="17967342" cy="707886"/>
+          </a:xfrm>
+          <a:prstGeom prst="rect">
+            <a:avLst/>
+          </a:prstGeom>
+        </p:spPr>
+        <p:txBody>
+          <a:bodyPr wrap="square">
+            <a:spAutoFit/>
+          </a:bodyPr>
+          <a:lstStyle/>
+          <a:p>
+            <a:r>
+              <a:rPr lang="en-US" sz="2000" dirty="0" smtClean="0"/>
+              <a:t>I </a:t>
+            </a:r>
+            <a:r>
+              <a:rPr lang="en-US" sz="2000" dirty="0"/>
+              <a:t>thought I would do a few more examples  of taking </a:t>
+            </a:r>
+            <a:r>
+              <a:rPr lang="en-US" sz="2000" dirty="0" err="1"/>
+              <a:t>antiderivatives</a:t>
+            </a:r>
+            <a:r>
+              <a:rPr lang="en-US" sz="2000" dirty="0"/>
+              <a:t>, just so we feel comfortable taking  </a:t>
+            </a:r>
+            <a:r>
+              <a:rPr lang="en-US" sz="2000" dirty="0" err="1"/>
+              <a:t>antiderivatives</a:t>
+            </a:r>
+            <a:r>
+              <a:rPr lang="en-US" sz="2000" dirty="0"/>
+              <a:t> of all of the basic functions  that we know how to take the derivatives of.  And on top of that, I just want to make it clear  that it doesn't always have to be functions of x. </a:t>
+            </a:r>
+          </a:p>
+        </p:txBody>
+      </p:sp>
+      <p:sp>
+        <p:nvSpPr>
+          <p:cNvPr id="8" name="Rectangle 7"/>
+          <p:cNvSpPr/>
+          <p:nvPr/>
+        </p:nvSpPr>
+        <p:spPr>
+          <a:xfrm>
+            <a:off x="144141" y="936229"/>
+            <a:ext cx="17569952" cy="707886"/>
+          </a:xfrm>
+          <a:prstGeom prst="rect">
+            <a:avLst/>
+          </a:prstGeom>
+        </p:spPr>
+        <p:txBody>
+          <a:bodyPr wrap="square">
+            <a:spAutoFit/>
+          </a:bodyPr>
+          <a:lstStyle/>
+          <a:p>
+            <a:r>
+              <a:rPr lang="en-US" sz="2000" dirty="0"/>
+              <a:t>Here we have a function of t, and we're  taking the </a:t>
+            </a:r>
+            <a:r>
+              <a:rPr lang="en-US" sz="2000" dirty="0" err="1"/>
+              <a:t>antiderivative</a:t>
+            </a:r>
+            <a:r>
+              <a:rPr lang="en-US" sz="2000" dirty="0"/>
+              <a:t> with respect to t.  And so you would not write a dx here.  That is not the notation.  You'll see why when we focus on definite integrals.  So what's the </a:t>
+            </a:r>
+            <a:r>
+              <a:rPr lang="en-US" sz="2000" dirty="0" err="1"/>
+              <a:t>antiderivative</a:t>
+            </a:r>
+            <a:r>
+              <a:rPr lang="en-US" sz="2000" dirty="0"/>
+              <a:t> of this business right over here?</a:t>
+            </a:r>
+          </a:p>
+        </p:txBody>
+      </p:sp>
+      <p:sp>
+        <p:nvSpPr>
+          <p:cNvPr id="9" name="Rectangle 8"/>
+          <p:cNvSpPr/>
+          <p:nvPr/>
+        </p:nvSpPr>
+        <p:spPr>
+          <a:xfrm>
+            <a:off x="216149" y="3384501"/>
+            <a:ext cx="17497944" cy="707886"/>
+          </a:xfrm>
+          <a:prstGeom prst="rect">
+            <a:avLst/>
+          </a:prstGeom>
+        </p:spPr>
+        <p:txBody>
+          <a:bodyPr wrap="square">
+            <a:spAutoFit/>
+          </a:bodyPr>
+          <a:lstStyle/>
+          <a:p>
+            <a:r>
+              <a:rPr lang="en-US" sz="2000" dirty="0"/>
+              <a:t>Well, it's going to be the same thing as the </a:t>
+            </a:r>
+            <a:r>
+              <a:rPr lang="en-US" sz="2000" dirty="0" err="1"/>
+              <a:t>antiderivative</a:t>
+            </a:r>
+            <a:r>
+              <a:rPr lang="en-US" sz="2000" dirty="0"/>
+              <a:t>  of sine of t, or the indefinite integral of sine of t,  plus the indefinite integral, or the </a:t>
+            </a:r>
+            <a:r>
+              <a:rPr lang="en-US" sz="2000" dirty="0" err="1"/>
+              <a:t>antiderivative</a:t>
+            </a:r>
+            <a:r>
+              <a:rPr lang="en-US" sz="2000" dirty="0"/>
+              <a:t>,  of cosine of t.</a:t>
+            </a:r>
+          </a:p>
+        </p:txBody>
+      </p:sp>
+      <p:pic>
+        <p:nvPicPr>
+          <p:cNvPr id="10" name="Picture 9" descr="panorama.png"/>
+          <p:cNvPicPr>
+            <a:picLocks noChangeAspect="1"/>
+          </p:cNvPicPr>
+          <p:nvPr/>
+        </p:nvPicPr>
+        <p:blipFill rotWithShape="1">
+          <a:blip r:embed="rId2">
+            <a:extLst>
+              <a:ext uri="{28A0092B-C50C-407E-A947-70E740481C1C}">
+                <a14:useLocalDpi xmlns:a14="http://schemas.microsoft.com/office/drawing/2010/main" val="0"/>
+              </a:ext>
+            </a:extLst>
+          </a:blip>
+          <a:srcRect l="2923" t="1263" r="34206" b="79567"/>
+          <a:stretch/>
+        </p:blipFill>
+        <p:spPr>
+          <a:xfrm>
+            <a:off x="942930" y="4152380"/>
+            <a:ext cx="10220280" cy="1752889"/>
+          </a:xfrm>
+          <a:prstGeom prst="rect">
+            <a:avLst/>
+          </a:prstGeom>
+        </p:spPr>
+      </p:pic>
+      <p:sp>
+        <p:nvSpPr>
+          <p:cNvPr id="12" name="Rectangle 11"/>
+          <p:cNvSpPr/>
+          <p:nvPr/>
+        </p:nvSpPr>
+        <p:spPr>
+          <a:xfrm>
+            <a:off x="216149" y="5832773"/>
+            <a:ext cx="17497944" cy="1323439"/>
+          </a:xfrm>
+          <a:prstGeom prst="rect">
+            <a:avLst/>
+          </a:prstGeom>
+        </p:spPr>
+        <p:txBody>
+          <a:bodyPr wrap="square">
+            <a:spAutoFit/>
+          </a:bodyPr>
+          <a:lstStyle/>
+          <a:p>
+            <a:r>
+              <a:rPr lang="en-US" sz="2000" dirty="0"/>
+              <a:t>So let's think about what these </a:t>
+            </a:r>
+            <a:r>
+              <a:rPr lang="en-US" sz="2000" dirty="0" err="1"/>
+              <a:t>antiderivatives</a:t>
+            </a:r>
+            <a:r>
+              <a:rPr lang="en-US" sz="2000" dirty="0"/>
+              <a:t> are.  And we already know a little bit about taking  the derivatives of trig functions.  We know that the derivative with respect to t of cosine of t  is equal to negative sine of t.  So if we want a sine of t here, we  would just have to take the derivative of negative cosine  t.  If we take the derivative of negative cosine t,  then we get positive sine of t.  The derivative with respect to t of cosine t  is negative sine of t.  We have the negative out front.  It becomes positive sine of t.  So the </a:t>
+            </a:r>
+            <a:r>
+              <a:rPr lang="en-US" sz="2000" dirty="0" err="1"/>
+              <a:t>antiderivative</a:t>
+            </a:r>
+            <a:r>
+              <a:rPr lang="en-US" sz="2000" dirty="0"/>
+              <a:t> of sine of t is negative cosine of t.  So this is going to be equal to negative cosine of t.</a:t>
+            </a:r>
+          </a:p>
+        </p:txBody>
+      </p:sp>
+      <p:pic>
+        <p:nvPicPr>
+          <p:cNvPr id="13" name="Picture 12" descr="panorama.png"/>
+          <p:cNvPicPr>
+            <a:picLocks noChangeAspect="1"/>
+          </p:cNvPicPr>
+          <p:nvPr/>
+        </p:nvPicPr>
+        <p:blipFill rotWithShape="1">
+          <a:blip r:embed="rId2">
+            <a:extLst>
+              <a:ext uri="{28A0092B-C50C-407E-A947-70E740481C1C}">
+                <a14:useLocalDpi xmlns:a14="http://schemas.microsoft.com/office/drawing/2010/main" val="0"/>
+              </a:ext>
+            </a:extLst>
+          </a:blip>
+          <a:srcRect l="2923" t="19794" r="62588" b="65685"/>
+          <a:stretch/>
+        </p:blipFill>
+        <p:spPr>
+          <a:xfrm>
+            <a:off x="936229" y="7488957"/>
+            <a:ext cx="5606545" cy="1327798"/>
+          </a:xfrm>
+          <a:prstGeom prst="rect">
+            <a:avLst/>
+          </a:prstGeom>
+        </p:spPr>
+      </p:pic>
+      <p:pic>
+        <p:nvPicPr>
+          <p:cNvPr id="14" name="Picture 13" descr="panorama.png"/>
+          <p:cNvPicPr>
+            <a:picLocks noChangeAspect="1"/>
+          </p:cNvPicPr>
+          <p:nvPr/>
+        </p:nvPicPr>
+        <p:blipFill rotWithShape="1">
+          <a:blip r:embed="rId2">
+            <a:extLst>
+              <a:ext uri="{28A0092B-C50C-407E-A947-70E740481C1C}">
+                <a14:useLocalDpi xmlns:a14="http://schemas.microsoft.com/office/drawing/2010/main" val="0"/>
+              </a:ext>
+            </a:extLst>
+          </a:blip>
+          <a:srcRect l="2922" t="1263" r="17693" b="79567"/>
+          <a:stretch/>
+        </p:blipFill>
+        <p:spPr>
+          <a:xfrm>
+            <a:off x="1008236" y="8641085"/>
+            <a:ext cx="12904780" cy="1752889"/>
+          </a:xfrm>
+          <a:prstGeom prst="rect">
+            <a:avLst/>
+          </a:prstGeom>
+        </p:spPr>
+      </p:pic>
+      <p:sp>
+        <p:nvSpPr>
+          <p:cNvPr id="15" name="Rectangle 14"/>
+          <p:cNvSpPr/>
+          <p:nvPr/>
+        </p:nvSpPr>
+        <p:spPr>
+          <a:xfrm>
+            <a:off x="34908" y="10441285"/>
+            <a:ext cx="17967342" cy="707886"/>
+          </a:xfrm>
+          <a:prstGeom prst="rect">
+            <a:avLst/>
+          </a:prstGeom>
+        </p:spPr>
+        <p:txBody>
+          <a:bodyPr wrap="square">
+            <a:spAutoFit/>
+          </a:bodyPr>
+          <a:lstStyle/>
+          <a:p>
+            <a:r>
+              <a:rPr lang="en-US" sz="2000" dirty="0"/>
+              <a:t>And then what's the </a:t>
+            </a:r>
+            <a:r>
+              <a:rPr lang="en-US" sz="2000" dirty="0" err="1"/>
+              <a:t>antiderivative</a:t>
+            </a:r>
+            <a:r>
+              <a:rPr lang="en-US" sz="2000" dirty="0"/>
+              <a:t> of cosine of t?  Well, we already know that the derivative with respect  to t of sine of t is equal to cosine of t.  So cosine of t's </a:t>
+            </a:r>
+            <a:r>
+              <a:rPr lang="en-US" sz="2000" dirty="0" err="1"/>
+              <a:t>antiderivative</a:t>
+            </a:r>
+            <a:r>
+              <a:rPr lang="en-US" sz="2000" dirty="0"/>
+              <a:t> is just  sine of t-- so plus sine of t.  And we're done.  We've found the </a:t>
+            </a:r>
+            <a:r>
+              <a:rPr lang="en-US" sz="2000" dirty="0" err="1"/>
+              <a:t>antiderivative</a:t>
+            </a:r>
+            <a:r>
+              <a:rPr lang="en-US" sz="2000" dirty="0"/>
+              <a:t>.</a:t>
+            </a:r>
+          </a:p>
+        </p:txBody>
+      </p:sp>
+      <p:pic>
+        <p:nvPicPr>
+          <p:cNvPr id="16" name="Picture 15" descr="panorama.png"/>
+          <p:cNvPicPr>
+            <a:picLocks noChangeAspect="1"/>
+          </p:cNvPicPr>
+          <p:nvPr/>
+        </p:nvPicPr>
+        <p:blipFill rotWithShape="1">
+          <a:blip r:embed="rId2">
+            <a:extLst>
+              <a:ext uri="{28A0092B-C50C-407E-A947-70E740481C1C}">
+                <a14:useLocalDpi xmlns:a14="http://schemas.microsoft.com/office/drawing/2010/main" val="0"/>
+              </a:ext>
+            </a:extLst>
+          </a:blip>
+          <a:srcRect l="2922" t="1263" r="10173" b="79567"/>
+          <a:stretch/>
+        </p:blipFill>
+        <p:spPr>
+          <a:xfrm>
+            <a:off x="1152253" y="12097469"/>
+            <a:ext cx="14127048" cy="1752889"/>
+          </a:xfrm>
+          <a:prstGeom prst="rect">
+            <a:avLst/>
+          </a:prstGeom>
+        </p:spPr>
+      </p:pic>
+      <p:pic>
+        <p:nvPicPr>
+          <p:cNvPr id="17" name="Picture 16" descr="panorama.png"/>
+          <p:cNvPicPr>
+            <a:picLocks noChangeAspect="1"/>
+          </p:cNvPicPr>
+          <p:nvPr/>
+        </p:nvPicPr>
+        <p:blipFill rotWithShape="1">
+          <a:blip r:embed="rId2">
+            <a:extLst>
+              <a:ext uri="{28A0092B-C50C-407E-A947-70E740481C1C}">
+                <a14:useLocalDpi xmlns:a14="http://schemas.microsoft.com/office/drawing/2010/main" val="0"/>
+              </a:ext>
+            </a:extLst>
+          </a:blip>
+          <a:srcRect l="3633" t="31790" r="61878" b="53689"/>
+          <a:stretch/>
+        </p:blipFill>
+        <p:spPr>
+          <a:xfrm>
+            <a:off x="1008237" y="11161365"/>
+            <a:ext cx="5606545" cy="1327798"/>
+          </a:xfrm>
+          <a:prstGeom prst="rect">
+            <a:avLst/>
+          </a:prstGeom>
+        </p:spPr>
+      </p:pic>
+    </p:spTree>
+    <p:extLst>
+      <p:ext uri="{BB962C8B-B14F-4D97-AF65-F5344CB8AC3E}">
+        <p14:creationId xmlns:p14="http://schemas.microsoft.com/office/powerpoint/2010/main" val="490249211"/>
+      </p:ext>
+    </p:extLst>
+  </p:cSld>
+  <p:clrMapOvr>
+    <a:masterClrMapping/>
+  </p:clrMapOvr>
 </p:sld>
 </file>
 

</xml_diff>